<commit_message>
Fixed parts of Week5, Week7 and uploaded Week8 (except homework)
</commit_message>
<xml_diff>
--- a/week5/week5.pptx
+++ b/week5/week5.pptx
@@ -393,7 +393,7 @@
           <a:p>
             <a:fld id="{4AAD347D-5ACD-4C99-B74B-A9C85AD731AF}" type="datetimeFigureOut">
               <a:rPr lang="en-US" dirty="0"/>
-              <a:t>3/7/2018</a:t>
+              <a:t>6/16/2018</a:t>
             </a:fld>
             <a:endParaRPr lang="en-US" dirty="0"/>
           </a:p>
@@ -663,7 +663,7 @@
           <a:p>
             <a:fld id="{4509A250-FF31-4206-8172-F9D3106AACB1}" type="datetimeFigureOut">
               <a:rPr lang="en-US" dirty="0"/>
-              <a:t>3/7/2018</a:t>
+              <a:t>6/16/2018</a:t>
             </a:fld>
             <a:endParaRPr lang="en-US" dirty="0"/>
           </a:p>
@@ -852,7 +852,7 @@
           <a:p>
             <a:fld id="{4509A250-FF31-4206-8172-F9D3106AACB1}" type="datetimeFigureOut">
               <a:rPr lang="en-US" dirty="0"/>
-              <a:t>3/7/2018</a:t>
+              <a:t>6/16/2018</a:t>
             </a:fld>
             <a:endParaRPr lang="en-US" dirty="0"/>
           </a:p>
@@ -1120,7 +1120,7 @@
           <a:p>
             <a:fld id="{4509A250-FF31-4206-8172-F9D3106AACB1}" type="datetimeFigureOut">
               <a:rPr lang="en-US" dirty="0"/>
-              <a:t>3/7/2018</a:t>
+              <a:t>6/16/2018</a:t>
             </a:fld>
             <a:endParaRPr lang="en-US" dirty="0"/>
           </a:p>
@@ -1456,7 +1456,7 @@
           <a:p>
             <a:fld id="{4509A250-FF31-4206-8172-F9D3106AACB1}" type="datetimeFigureOut">
               <a:rPr lang="en-US" dirty="0"/>
-              <a:t>3/7/2018</a:t>
+              <a:t>6/16/2018</a:t>
             </a:fld>
             <a:endParaRPr lang="en-US" dirty="0"/>
           </a:p>
@@ -2074,7 +2074,7 @@
           <a:p>
             <a:fld id="{4509A250-FF31-4206-8172-F9D3106AACB1}" type="datetimeFigureOut">
               <a:rPr lang="en-US" dirty="0"/>
-              <a:t>3/7/2018</a:t>
+              <a:t>6/16/2018</a:t>
             </a:fld>
             <a:endParaRPr lang="en-US" dirty="0"/>
           </a:p>
@@ -2929,7 +2929,7 @@
           <a:p>
             <a:fld id="{4509A250-FF31-4206-8172-F9D3106AACB1}" type="datetimeFigureOut">
               <a:rPr lang="en-US" dirty="0"/>
-              <a:t>3/7/2018</a:t>
+              <a:t>6/16/2018</a:t>
             </a:fld>
             <a:endParaRPr lang="en-US" dirty="0"/>
           </a:p>
@@ -3094,7 +3094,7 @@
           <a:p>
             <a:fld id="{4509A250-FF31-4206-8172-F9D3106AACB1}" type="datetimeFigureOut">
               <a:rPr lang="en-US" dirty="0"/>
-              <a:t>3/7/2018</a:t>
+              <a:t>6/16/2018</a:t>
             </a:fld>
             <a:endParaRPr lang="en-US" dirty="0"/>
           </a:p>
@@ -3269,7 +3269,7 @@
           <a:p>
             <a:fld id="{4509A250-FF31-4206-8172-F9D3106AACB1}" type="datetimeFigureOut">
               <a:rPr lang="en-US" dirty="0"/>
-              <a:t>3/7/2018</a:t>
+              <a:t>6/16/2018</a:t>
             </a:fld>
             <a:endParaRPr lang="en-US" dirty="0"/>
           </a:p>
@@ -3434,7 +3434,7 @@
           <a:p>
             <a:fld id="{4509A250-FF31-4206-8172-F9D3106AACB1}" type="datetimeFigureOut">
               <a:rPr lang="en-US" dirty="0"/>
-              <a:t>3/7/2018</a:t>
+              <a:t>6/16/2018</a:t>
             </a:fld>
             <a:endParaRPr lang="en-US" dirty="0"/>
           </a:p>
@@ -3676,7 +3676,7 @@
           <a:p>
             <a:fld id="{9796027F-7875-4030-9381-8BD8C4F21935}" type="datetimeFigureOut">
               <a:rPr lang="en-US" dirty="0"/>
-              <a:t>3/7/2018</a:t>
+              <a:t>6/16/2018</a:t>
             </a:fld>
             <a:endParaRPr lang="en-US" dirty="0"/>
           </a:p>
@@ -3963,7 +3963,7 @@
           <a:p>
             <a:fld id="{9796027F-7875-4030-9381-8BD8C4F21935}" type="datetimeFigureOut">
               <a:rPr lang="en-US" dirty="0"/>
-              <a:t>3/7/2018</a:t>
+              <a:t>6/16/2018</a:t>
             </a:fld>
             <a:endParaRPr lang="en-US" dirty="0"/>
           </a:p>
@@ -4402,7 +4402,7 @@
           <a:p>
             <a:fld id="{9796027F-7875-4030-9381-8BD8C4F21935}" type="datetimeFigureOut">
               <a:rPr lang="en-US" dirty="0"/>
-              <a:t>3/7/2018</a:t>
+              <a:t>6/16/2018</a:t>
             </a:fld>
             <a:endParaRPr lang="en-US" dirty="0"/>
           </a:p>
@@ -4515,7 +4515,7 @@
           <a:p>
             <a:fld id="{4509A250-FF31-4206-8172-F9D3106AACB1}" type="datetimeFigureOut">
               <a:rPr lang="en-US" dirty="0"/>
-              <a:t>3/7/2018</a:t>
+              <a:t>6/16/2018</a:t>
             </a:fld>
             <a:endParaRPr lang="en-US" dirty="0"/>
           </a:p>
@@ -4605,7 +4605,7 @@
           <a:p>
             <a:fld id="{4509A250-FF31-4206-8172-F9D3106AACB1}" type="datetimeFigureOut">
               <a:rPr lang="en-US" dirty="0"/>
-              <a:t>3/7/2018</a:t>
+              <a:t>6/16/2018</a:t>
             </a:fld>
             <a:endParaRPr lang="en-US" dirty="0"/>
           </a:p>
@@ -4879,7 +4879,7 @@
           <a:p>
             <a:fld id="{4509A250-FF31-4206-8172-F9D3106AACB1}" type="datetimeFigureOut">
               <a:rPr lang="en-US" dirty="0"/>
-              <a:t>3/7/2018</a:t>
+              <a:t>6/16/2018</a:t>
             </a:fld>
             <a:endParaRPr lang="en-US" dirty="0"/>
           </a:p>
@@ -5149,7 +5149,7 @@
           <a:p>
             <a:fld id="{4509A250-FF31-4206-8172-F9D3106AACB1}" type="datetimeFigureOut">
               <a:rPr lang="en-US" dirty="0"/>
-              <a:t>3/7/2018</a:t>
+              <a:t>6/16/2018</a:t>
             </a:fld>
             <a:endParaRPr lang="en-US" dirty="0"/>
           </a:p>
@@ -5573,7 +5573,7 @@
           <a:p>
             <a:fld id="{4AAD347D-5ACD-4C99-B74B-A9C85AD731AF}" type="datetimeFigureOut">
               <a:rPr lang="en-US" dirty="0"/>
-              <a:t>3/7/2018</a:t>
+              <a:t>6/16/2018</a:t>
             </a:fld>
             <a:endParaRPr lang="en-US" dirty="0"/>
           </a:p>
@@ -6140,11 +6140,7 @@
           <a:p>
             <a:r>
               <a:rPr lang="en-GB" dirty="0" smtClean="0"/>
-              <a:t>Week </a:t>
-            </a:r>
-            <a:r>
-              <a:rPr lang="en-GB" dirty="0" smtClean="0"/>
-              <a:t>5: Modules, Dictionaries, Randomness and Files</a:t>
+              <a:t>Week 5: Modules, Dictionaries, Randomness and Files</a:t>
             </a:r>
             <a:endParaRPr lang="en-GB" dirty="0"/>
           </a:p>
@@ -12273,19 +12269,13 @@
             <a:pPr lvl="1"/>
             <a:r>
               <a:rPr lang="en-GB" dirty="0" smtClean="0"/>
-              <a:t>Reading and Writing from files on the disk.</a:t>
-            </a:r>
-          </a:p>
-          <a:p>
-            <a:pPr lvl="1"/>
-            <a:endParaRPr lang="en-GB" dirty="0"/>
-          </a:p>
-          <a:p>
-            <a:r>
-              <a:rPr lang="en-GB" sz="1600" i="1" dirty="0" smtClean="0"/>
-              <a:t>We will also get to work with palindromes.</a:t>
-            </a:r>
-            <a:endParaRPr lang="en-GB" sz="1600" i="1" dirty="0"/>
+              <a:t>Reading and Writing from files on the disk</a:t>
+            </a:r>
+            <a:r>
+              <a:rPr lang="en-GB" dirty="0" smtClean="0"/>
+              <a:t>.</a:t>
+            </a:r>
+            <a:endParaRPr lang="en-GB" dirty="0" smtClean="0"/>
           </a:p>
         </p:txBody>
       </p:sp>
@@ -18020,8 +18010,38 @@
                   <a:srgbClr val="FFFF00"/>
                 </a:solidFill>
               </a:rPr>
-              <a:t>Tip: Remember to strip off the newline !</a:t>
-            </a:r>
+              <a:t>Tip: Remember to strip off the newline </a:t>
+            </a:r>
+            <a:r>
+              <a:rPr lang="en-GB" dirty="0" smtClean="0">
+                <a:solidFill>
+                  <a:srgbClr val="FFFF00"/>
+                </a:solidFill>
+              </a:rPr>
+              <a:t>!</a:t>
+            </a:r>
+          </a:p>
+          <a:p>
+            <a:endParaRPr lang="en-GB" dirty="0" smtClean="0">
+              <a:solidFill>
+                <a:srgbClr val="FFFF00"/>
+              </a:solidFill>
+            </a:endParaRPr>
+          </a:p>
+          <a:p>
+            <a:r>
+              <a:rPr lang="en-GB" dirty="0" smtClean="0"/>
+              <a:t>Your task is to find all the palindromes in that word list.</a:t>
+            </a:r>
+          </a:p>
+          <a:p>
+            <a:pPr lvl="1"/>
+            <a:r>
+              <a:rPr lang="en-GB" i="1" dirty="0"/>
+              <a:t>If you don't know what a palindrome is, look it up on the internet or in a dictionary.</a:t>
+            </a:r>
+          </a:p>
+          <a:p>
             <a:endParaRPr lang="en-GB" dirty="0">
               <a:solidFill>
                 <a:srgbClr val="FFFF00"/>

</xml_diff>